<commit_message>
Final viva PP change
</commit_message>
<xml_diff>
--- a/Documentation/VivaPP.pptx
+++ b/Documentation/VivaPP.pptx
@@ -7,12 +7,13 @@
   <p:sldIdLst>
     <p:sldId id="256" r:id="rId2"/>
     <p:sldId id="257" r:id="rId3"/>
-    <p:sldId id="258" r:id="rId4"/>
-    <p:sldId id="259" r:id="rId5"/>
-    <p:sldId id="260" r:id="rId6"/>
-    <p:sldId id="262" r:id="rId7"/>
-    <p:sldId id="261" r:id="rId8"/>
-    <p:sldId id="263" r:id="rId9"/>
+    <p:sldId id="264" r:id="rId4"/>
+    <p:sldId id="258" r:id="rId5"/>
+    <p:sldId id="259" r:id="rId6"/>
+    <p:sldId id="260" r:id="rId7"/>
+    <p:sldId id="262" r:id="rId8"/>
+    <p:sldId id="261" r:id="rId9"/>
+    <p:sldId id="263" r:id="rId10"/>
   </p:sldIdLst>
   <p:sldSz cx="12192000" cy="6858000"/>
   <p:notesSz cx="6858000" cy="9144000"/>
@@ -111,6 +112,11 @@
       </a:defRPr>
     </a:lvl9pPr>
   </p:defaultTextStyle>
+  <p:extLst>
+    <p:ext uri="{EFAFB233-063F-42B5-8137-9DF3F51BA10A}">
+      <p15:sldGuideLst xmlns:p15="http://schemas.microsoft.com/office/powerpoint/2012/main"/>
+    </p:ext>
+  </p:extLst>
 </p:presentation>
 </file>
 
@@ -449,7 +455,7 @@
           <a:p>
             <a:fld id="{4D4FDD8C-423C-45CD-BB78-8E74372AD92D}" type="datetimeFigureOut">
               <a:rPr lang="en-GB" smtClean="0"/>
-              <a:t>11/05/2025</a:t>
+              <a:t>12/05/2025</a:t>
             </a:fld>
             <a:endParaRPr lang="en-GB"/>
           </a:p>
@@ -1537,7 +1543,7 @@
           <a:p>
             <a:fld id="{4D4FDD8C-423C-45CD-BB78-8E74372AD92D}" type="datetimeFigureOut">
               <a:rPr lang="en-GB" smtClean="0"/>
-              <a:t>11/05/2025</a:t>
+              <a:t>12/05/2025</a:t>
             </a:fld>
             <a:endParaRPr lang="en-GB"/>
           </a:p>
@@ -2517,7 +2523,7 @@
           <a:p>
             <a:fld id="{4D4FDD8C-423C-45CD-BB78-8E74372AD92D}" type="datetimeFigureOut">
               <a:rPr lang="en-GB" smtClean="0"/>
-              <a:t>11/05/2025</a:t>
+              <a:t>12/05/2025</a:t>
             </a:fld>
             <a:endParaRPr lang="en-GB"/>
           </a:p>
@@ -3651,7 +3657,7 @@
           <a:p>
             <a:fld id="{4D4FDD8C-423C-45CD-BB78-8E74372AD92D}" type="datetimeFigureOut">
               <a:rPr lang="en-GB" smtClean="0"/>
-              <a:t>11/05/2025</a:t>
+              <a:t>12/05/2025</a:t>
             </a:fld>
             <a:endParaRPr lang="en-GB"/>
           </a:p>
@@ -4684,7 +4690,7 @@
           <a:p>
             <a:fld id="{4D4FDD8C-423C-45CD-BB78-8E74372AD92D}" type="datetimeFigureOut">
               <a:rPr lang="en-GB" smtClean="0"/>
-              <a:t>11/05/2025</a:t>
+              <a:t>12/05/2025</a:t>
             </a:fld>
             <a:endParaRPr lang="en-GB"/>
           </a:p>
@@ -5344,7 +5350,7 @@
           <a:p>
             <a:fld id="{4D4FDD8C-423C-45CD-BB78-8E74372AD92D}" type="datetimeFigureOut">
               <a:rPr lang="en-GB" smtClean="0"/>
-              <a:t>11/05/2025</a:t>
+              <a:t>12/05/2025</a:t>
             </a:fld>
             <a:endParaRPr lang="en-GB"/>
           </a:p>
@@ -6205,7 +6211,7 @@
           <a:p>
             <a:fld id="{4D4FDD8C-423C-45CD-BB78-8E74372AD92D}" type="datetimeFigureOut">
               <a:rPr lang="en-GB" smtClean="0"/>
-              <a:t>11/05/2025</a:t>
+              <a:t>12/05/2025</a:t>
             </a:fld>
             <a:endParaRPr lang="en-GB"/>
           </a:p>
@@ -6395,7 +6401,7 @@
           <a:p>
             <a:fld id="{4D4FDD8C-423C-45CD-BB78-8E74372AD92D}" type="datetimeFigureOut">
               <a:rPr lang="en-GB" smtClean="0"/>
-              <a:t>11/05/2025</a:t>
+              <a:t>12/05/2025</a:t>
             </a:fld>
             <a:endParaRPr lang="en-GB"/>
           </a:p>
@@ -7367,7 +7373,7 @@
           <a:p>
             <a:fld id="{4D4FDD8C-423C-45CD-BB78-8E74372AD92D}" type="datetimeFigureOut">
               <a:rPr lang="en-GB" smtClean="0"/>
-              <a:t>11/05/2025</a:t>
+              <a:t>12/05/2025</a:t>
             </a:fld>
             <a:endParaRPr lang="en-GB"/>
           </a:p>
@@ -7578,7 +7584,7 @@
           <a:p>
             <a:fld id="{4D4FDD8C-423C-45CD-BB78-8E74372AD92D}" type="datetimeFigureOut">
               <a:rPr lang="en-GB" smtClean="0"/>
-              <a:t>11/05/2025</a:t>
+              <a:t>12/05/2025</a:t>
             </a:fld>
             <a:endParaRPr lang="en-GB"/>
           </a:p>
@@ -8612,7 +8618,7 @@
           <a:p>
             <a:fld id="{4D4FDD8C-423C-45CD-BB78-8E74372AD92D}" type="datetimeFigureOut">
               <a:rPr lang="en-GB" smtClean="0"/>
-              <a:t>11/05/2025</a:t>
+              <a:t>12/05/2025</a:t>
             </a:fld>
             <a:endParaRPr lang="en-GB"/>
           </a:p>
@@ -8884,7 +8890,7 @@
           <a:p>
             <a:fld id="{4D4FDD8C-423C-45CD-BB78-8E74372AD92D}" type="datetimeFigureOut">
               <a:rPr lang="en-GB" smtClean="0"/>
-              <a:t>11/05/2025</a:t>
+              <a:t>12/05/2025</a:t>
             </a:fld>
             <a:endParaRPr lang="en-GB"/>
           </a:p>
@@ -9294,7 +9300,7 @@
           <a:p>
             <a:fld id="{4D4FDD8C-423C-45CD-BB78-8E74372AD92D}" type="datetimeFigureOut">
               <a:rPr lang="en-GB" smtClean="0"/>
-              <a:t>11/05/2025</a:t>
+              <a:t>12/05/2025</a:t>
             </a:fld>
             <a:endParaRPr lang="en-GB"/>
           </a:p>
@@ -9421,7 +9427,7 @@
           <a:p>
             <a:fld id="{4D4FDD8C-423C-45CD-BB78-8E74372AD92D}" type="datetimeFigureOut">
               <a:rPr lang="en-GB" smtClean="0"/>
-              <a:t>11/05/2025</a:t>
+              <a:t>12/05/2025</a:t>
             </a:fld>
             <a:endParaRPr lang="en-GB"/>
           </a:p>
@@ -9516,7 +9522,7 @@
           <a:p>
             <a:fld id="{4D4FDD8C-423C-45CD-BB78-8E74372AD92D}" type="datetimeFigureOut">
               <a:rPr lang="en-GB" smtClean="0"/>
-              <a:t>11/05/2025</a:t>
+              <a:t>12/05/2025</a:t>
             </a:fld>
             <a:endParaRPr lang="en-GB"/>
           </a:p>
@@ -10597,7 +10603,7 @@
           <a:p>
             <a:fld id="{4D4FDD8C-423C-45CD-BB78-8E74372AD92D}" type="datetimeFigureOut">
               <a:rPr lang="en-GB" smtClean="0"/>
-              <a:t>11/05/2025</a:t>
+              <a:t>12/05/2025</a:t>
             </a:fld>
             <a:endParaRPr lang="en-GB"/>
           </a:p>
@@ -11705,7 +11711,7 @@
           <a:p>
             <a:fld id="{4D4FDD8C-423C-45CD-BB78-8E74372AD92D}" type="datetimeFigureOut">
               <a:rPr lang="en-GB" smtClean="0"/>
-              <a:t>11/05/2025</a:t>
+              <a:t>12/05/2025</a:t>
             </a:fld>
             <a:endParaRPr lang="en-GB"/>
           </a:p>
@@ -12702,7 +12708,7 @@
           <a:p>
             <a:fld id="{4D4FDD8C-423C-45CD-BB78-8E74372AD92D}" type="datetimeFigureOut">
               <a:rPr lang="en-GB" smtClean="0"/>
-              <a:t>11/05/2025</a:t>
+              <a:t>12/05/2025</a:t>
             </a:fld>
             <a:endParaRPr lang="en-GB"/>
           </a:p>
@@ -13407,7 +13413,12 @@
             <p:ph idx="1"/>
           </p:nvPr>
         </p:nvSpPr>
-        <p:spPr/>
+        <p:spPr>
+          <a:xfrm>
+            <a:off x="1154954" y="2603500"/>
+            <a:ext cx="10220182" cy="3513836"/>
+          </a:xfrm>
+        </p:spPr>
         <p:txBody>
           <a:bodyPr/>
           <a:lstStyle/>
@@ -13436,7 +13447,10 @@
             </a:r>
           </a:p>
           <a:p>
-            <a:endParaRPr lang="en-GB" dirty="0"/>
+            <a:r>
+              <a:rPr lang="en-GB" dirty="0"/>
+              <a:t>I made mine because of the decline in round-based games recently with companies focusing on microtransactions and not towards the development of the game</a:t>
+            </a:r>
           </a:p>
         </p:txBody>
       </p:sp>
@@ -13454,6 +13468,136 @@
 </file>
 
 <file path=ppt/slides/slide3.xml><?xml version="1.0" encoding="utf-8"?>
+<p:sld xmlns:a="http://schemas.openxmlformats.org/drawingml/2006/main" xmlns:r="http://schemas.openxmlformats.org/officeDocument/2006/relationships" xmlns:p="http://schemas.openxmlformats.org/presentationml/2006/main">
+  <p:cSld>
+    <p:spTree>
+      <p:nvGrpSpPr>
+        <p:cNvPr id="1" name="">
+          <a:extLst>
+            <a:ext uri="{FF2B5EF4-FFF2-40B4-BE49-F238E27FC236}">
+              <a16:creationId xmlns:a16="http://schemas.microsoft.com/office/drawing/2014/main" id="{5316B3F8-2EEC-3076-BACC-8CCDD073CF1C}"/>
+            </a:ext>
+          </a:extLst>
+        </p:cNvPr>
+        <p:cNvGrpSpPr/>
+        <p:nvPr/>
+      </p:nvGrpSpPr>
+      <p:grpSpPr>
+        <a:xfrm>
+          <a:off x="0" y="0"/>
+          <a:ext cx="0" cy="0"/>
+          <a:chOff x="0" y="0"/>
+          <a:chExt cx="0" cy="0"/>
+        </a:xfrm>
+      </p:grpSpPr>
+      <p:sp>
+        <p:nvSpPr>
+          <p:cNvPr id="2" name="Title 1">
+            <a:extLst>
+              <a:ext uri="{FF2B5EF4-FFF2-40B4-BE49-F238E27FC236}">
+                <a16:creationId xmlns:a16="http://schemas.microsoft.com/office/drawing/2014/main" id="{EADB1036-CE8A-DB9F-9B5B-BCBFC1C11D17}"/>
+              </a:ext>
+            </a:extLst>
+          </p:cNvPr>
+          <p:cNvSpPr>
+            <a:spLocks noGrp="1"/>
+          </p:cNvSpPr>
+          <p:nvPr>
+            <p:ph type="title"/>
+          </p:nvPr>
+        </p:nvSpPr>
+        <p:spPr/>
+        <p:txBody>
+          <a:bodyPr/>
+          <a:lstStyle/>
+          <a:p>
+            <a:r>
+              <a:rPr lang="en-GB" dirty="0"/>
+              <a:t>What makes it unique </a:t>
+            </a:r>
+          </a:p>
+        </p:txBody>
+      </p:sp>
+      <p:sp>
+        <p:nvSpPr>
+          <p:cNvPr id="3" name="Content Placeholder 2">
+            <a:extLst>
+              <a:ext uri="{FF2B5EF4-FFF2-40B4-BE49-F238E27FC236}">
+                <a16:creationId xmlns:a16="http://schemas.microsoft.com/office/drawing/2014/main" id="{69DA3023-65E6-BB6E-DDA1-78353F7F3B3E}"/>
+              </a:ext>
+            </a:extLst>
+          </p:cNvPr>
+          <p:cNvSpPr>
+            <a:spLocks noGrp="1"/>
+          </p:cNvSpPr>
+          <p:nvPr>
+            <p:ph idx="1"/>
+          </p:nvPr>
+        </p:nvSpPr>
+        <p:spPr>
+          <a:xfrm>
+            <a:off x="493776" y="2560320"/>
+            <a:ext cx="10881360" cy="3904488"/>
+          </a:xfrm>
+        </p:spPr>
+        <p:txBody>
+          <a:bodyPr/>
+          <a:lstStyle/>
+          <a:p>
+            <a:pPr marL="0" indent="0">
+              <a:buNone/>
+            </a:pPr>
+            <a:r>
+              <a:rPr lang="en-GB" dirty="0"/>
+              <a:t>This project is unique as it creates 2 scripts that work hand in hand to create the main mechanics for any round-based game. Endless levels can now be created with the use of these scripts, and they can be altered with ease, creating an easy framework to work in</a:t>
+            </a:r>
+          </a:p>
+          <a:p>
+            <a:pPr marL="0" indent="0">
+              <a:buNone/>
+            </a:pPr>
+            <a:r>
+              <a:rPr lang="en-GB" dirty="0"/>
+              <a:t>Enemy Spawner Script</a:t>
+            </a:r>
+          </a:p>
+          <a:p>
+            <a:r>
+              <a:rPr lang="en-GB" dirty="0"/>
+              <a:t>Handles Boss and Enemy prefabs, spawn points are created and dragged onto this script along with the attachment of the wave manager script</a:t>
+            </a:r>
+          </a:p>
+          <a:p>
+            <a:pPr marL="0" indent="0">
+              <a:buNone/>
+            </a:pPr>
+            <a:r>
+              <a:rPr lang="en-GB" dirty="0"/>
+              <a:t>Wave Manager script</a:t>
+            </a:r>
+          </a:p>
+          <a:p>
+            <a:r>
+              <a:rPr lang="en-GB" dirty="0"/>
+              <a:t>Handles the wave logic such as number of rounds, kills, when to spawn the boss, also updates UI in real-time</a:t>
+            </a:r>
+          </a:p>
+        </p:txBody>
+      </p:sp>
+    </p:spTree>
+    <p:extLst>
+      <p:ext uri="{BB962C8B-B14F-4D97-AF65-F5344CB8AC3E}">
+        <p14:creationId xmlns:p14="http://schemas.microsoft.com/office/powerpoint/2010/main" val="49844434"/>
+      </p:ext>
+    </p:extLst>
+  </p:cSld>
+  <p:clrMapOvr>
+    <a:masterClrMapping/>
+  </p:clrMapOvr>
+</p:sld>
+</file>
+
+<file path=ppt/slides/slide4.xml><?xml version="1.0" encoding="utf-8"?>
 <p:sld xmlns:a="http://schemas.openxmlformats.org/drawingml/2006/main" xmlns:r="http://schemas.openxmlformats.org/officeDocument/2006/relationships" xmlns:p="http://schemas.openxmlformats.org/presentationml/2006/main">
   <p:cSld>
     <p:spTree>
@@ -13567,7 +13711,7 @@
 </p:sld>
 </file>
 
-<file path=ppt/slides/slide4.xml><?xml version="1.0" encoding="utf-8"?>
+<file path=ppt/slides/slide5.xml><?xml version="1.0" encoding="utf-8"?>
 <p:sld xmlns:a="http://schemas.openxmlformats.org/drawingml/2006/main" xmlns:r="http://schemas.openxmlformats.org/officeDocument/2006/relationships" xmlns:p="http://schemas.openxmlformats.org/presentationml/2006/main">
   <p:cSld>
     <p:spTree>
@@ -13698,7 +13842,7 @@
 </p:sld>
 </file>
 
-<file path=ppt/slides/slide5.xml><?xml version="1.0" encoding="utf-8"?>
+<file path=ppt/slides/slide6.xml><?xml version="1.0" encoding="utf-8"?>
 <p:sld xmlns:a="http://schemas.openxmlformats.org/drawingml/2006/main" xmlns:r="http://schemas.openxmlformats.org/officeDocument/2006/relationships" xmlns:p="http://schemas.openxmlformats.org/presentationml/2006/main">
   <p:cSld>
     <p:spTree>
@@ -13807,7 +13951,7 @@
 </p:sld>
 </file>
 
-<file path=ppt/slides/slide6.xml><?xml version="1.0" encoding="utf-8"?>
+<file path=ppt/slides/slide7.xml><?xml version="1.0" encoding="utf-8"?>
 <p:sld xmlns:a="http://schemas.openxmlformats.org/drawingml/2006/main" xmlns:r="http://schemas.openxmlformats.org/officeDocument/2006/relationships" xmlns:p="http://schemas.openxmlformats.org/presentationml/2006/main">
   <p:cSld>
     <p:spTree>
@@ -13975,7 +14119,7 @@
 </p:sld>
 </file>
 
-<file path=ppt/slides/slide7.xml><?xml version="1.0" encoding="utf-8"?>
+<file path=ppt/slides/slide8.xml><?xml version="1.0" encoding="utf-8"?>
 <p:sld xmlns:a="http://schemas.openxmlformats.org/drawingml/2006/main" xmlns:r="http://schemas.openxmlformats.org/officeDocument/2006/relationships" xmlns:p="http://schemas.openxmlformats.org/presentationml/2006/main">
   <p:cSld>
     <p:spTree>
@@ -14090,7 +14234,7 @@
 </p:sld>
 </file>
 
-<file path=ppt/slides/slide8.xml><?xml version="1.0" encoding="utf-8"?>
+<file path=ppt/slides/slide9.xml><?xml version="1.0" encoding="utf-8"?>
 <p:sld xmlns:a="http://schemas.openxmlformats.org/drawingml/2006/main" xmlns:r="http://schemas.openxmlformats.org/officeDocument/2006/relationships" xmlns:p="http://schemas.openxmlformats.org/presentationml/2006/main">
   <p:cSld>
     <p:spTree>

</xml_diff>